<commit_message>
NSF logo poster update
</commit_message>
<xml_diff>
--- a/reports/WT_Poster_v4.pptx
+++ b/reports/WT_Poster_v4.pptx
@@ -255,7 +255,7 @@
             <a:fld id="{4515C850-977F-4425-946C-FDF18C8806C6}" type="datetime1">
               <a:rPr lang="en-US"/>
               <a:pPr/>
-              <a:t>8/28/2017</a:t>
+              <a:t>9/8/2017</a:t>
             </a:fld>
             <a:endParaRPr lang="en-US"/>
           </a:p>
@@ -614,7 +614,7 @@
           </a:ln>
           <a:extLst>
             <a:ext uri="{909E8E84-426E-40dd-AFC4-6F175D3DCCD1}">
-              <a14:hiddenFill xmlns:a14="http://schemas.microsoft.com/office/drawing/2010/main" xmlns="">
+              <a14:hiddenFill xmlns="" xmlns:a14="http://schemas.microsoft.com/office/drawing/2010/main">
                 <a:solidFill>
                   <a:srgbClr val="FFFFFF"/>
                 </a:solidFill>
@@ -637,14 +637,14 @@
           <a:noFill/>
           <a:extLst>
             <a:ext uri="{909E8E84-426E-40dd-AFC4-6F175D3DCCD1}">
-              <a14:hiddenFill xmlns:a14="http://schemas.microsoft.com/office/drawing/2010/main" xmlns="">
+              <a14:hiddenFill xmlns="" xmlns:a14="http://schemas.microsoft.com/office/drawing/2010/main">
                 <a:solidFill>
                   <a:srgbClr val="FFFFFF"/>
                 </a:solidFill>
               </a14:hiddenFill>
             </a:ext>
             <a:ext uri="{91240B29-F687-4f45-9708-019B960494DF}">
-              <a14:hiddenLine xmlns:a14="http://schemas.microsoft.com/office/drawing/2010/main" xmlns="" w="9525">
+              <a14:hiddenLine xmlns="" xmlns:a14="http://schemas.microsoft.com/office/drawing/2010/main" w="9525">
                 <a:solidFill>
                   <a:srgbClr val="000000"/>
                 </a:solidFill>
@@ -1003,7 +1003,7 @@
             <a:fld id="{AA2AC842-8558-4AC8-B9E2-87B4AF0E5092}" type="datetime1">
               <a:rPr lang="en-US"/>
               <a:pPr/>
-              <a:t>8/28/2017</a:t>
+              <a:t>9/8/2017</a:t>
             </a:fld>
             <a:endParaRPr lang="en-US"/>
           </a:p>
@@ -1185,7 +1185,7 @@
             <a:fld id="{DF378F2E-43CF-494D-8AA1-0E25E3A6D7E5}" type="datetime1">
               <a:rPr lang="en-US"/>
               <a:pPr/>
-              <a:t>8/28/2017</a:t>
+              <a:t>9/8/2017</a:t>
             </a:fld>
             <a:endParaRPr lang="en-US"/>
           </a:p>
@@ -1377,7 +1377,7 @@
             <a:fld id="{FCAA0075-A89C-4CC4-8D44-BE21213EC665}" type="datetime1">
               <a:rPr lang="en-US"/>
               <a:pPr/>
-              <a:t>8/28/2017</a:t>
+              <a:t>9/8/2017</a:t>
             </a:fld>
             <a:endParaRPr lang="en-US"/>
           </a:p>
@@ -1559,7 +1559,7 @@
             <a:fld id="{3FBD16BB-C81B-488C-A058-02DF1EBA30A9}" type="datetime1">
               <a:rPr lang="en-US"/>
               <a:pPr/>
-              <a:t>8/28/2017</a:t>
+              <a:t>9/8/2017</a:t>
             </a:fld>
             <a:endParaRPr lang="en-US"/>
           </a:p>
@@ -1818,7 +1818,7 @@
             <a:fld id="{61D71B2D-85F4-4D1F-A97A-0F3FCF28FF78}" type="datetime1">
               <a:rPr lang="en-US"/>
               <a:pPr/>
-              <a:t>8/28/2017</a:t>
+              <a:t>9/8/2017</a:t>
             </a:fld>
             <a:endParaRPr lang="en-US"/>
           </a:p>
@@ -2117,7 +2117,7 @@
             <a:fld id="{543EB801-F414-4E3F-810B-AB50C12F8E62}" type="datetime1">
               <a:rPr lang="en-US"/>
               <a:pPr/>
-              <a:t>8/28/2017</a:t>
+              <a:t>9/8/2017</a:t>
             </a:fld>
             <a:endParaRPr lang="en-US"/>
           </a:p>
@@ -2555,7 +2555,7 @@
             <a:fld id="{8FB21926-4148-4271-A9EA-9B5C988855C5}" type="datetime1">
               <a:rPr lang="en-US"/>
               <a:pPr/>
-              <a:t>8/28/2017</a:t>
+              <a:t>9/8/2017</a:t>
             </a:fld>
             <a:endParaRPr lang="en-US"/>
           </a:p>
@@ -2686,7 +2686,7 @@
             <a:fld id="{BAA8212A-8BC5-4403-9CF2-3B62135E8215}" type="datetime1">
               <a:rPr lang="en-US"/>
               <a:pPr/>
-              <a:t>8/28/2017</a:t>
+              <a:t>9/8/2017</a:t>
             </a:fld>
             <a:endParaRPr lang="en-US"/>
           </a:p>
@@ -2795,7 +2795,7 @@
             <a:fld id="{DAB8904B-D74D-4D4C-AF9F-80D5C0011187}" type="datetime1">
               <a:rPr lang="en-US"/>
               <a:pPr/>
-              <a:t>8/28/2017</a:t>
+              <a:t>9/8/2017</a:t>
             </a:fld>
             <a:endParaRPr lang="en-US"/>
           </a:p>
@@ -3084,7 +3084,7 @@
             <a:fld id="{5AFA53D8-5F34-42FF-A06B-C0EDA73AA4FC}" type="datetime1">
               <a:rPr lang="en-US"/>
               <a:pPr/>
-              <a:t>8/28/2017</a:t>
+              <a:t>9/8/2017</a:t>
             </a:fld>
             <a:endParaRPr lang="en-US"/>
           </a:p>
@@ -3356,7 +3356,7 @@
             <a:fld id="{97FD32E0-1D5E-4345-BC8F-A88532F655AC}" type="datetime1">
               <a:rPr lang="en-US"/>
               <a:pPr/>
-              <a:t>8/28/2017</a:t>
+              <a:t>9/8/2017</a:t>
             </a:fld>
             <a:endParaRPr lang="en-US"/>
           </a:p>
@@ -3472,14 +3472,14 @@
           </a:ln>
           <a:extLst>
             <a:ext uri="{909E8E84-426E-40dd-AFC4-6F175D3DCCD1}">
-              <a14:hiddenFill xmlns:a14="http://schemas.microsoft.com/office/drawing/2010/main" xmlns="">
+              <a14:hiddenFill xmlns="" xmlns:a14="http://schemas.microsoft.com/office/drawing/2010/main">
                 <a:solidFill>
                   <a:srgbClr val="FFFFFF"/>
                 </a:solidFill>
               </a14:hiddenFill>
             </a:ext>
             <a:ext uri="{91240B29-F687-4f45-9708-019B960494DF}">
-              <a14:hiddenLine xmlns:a14="http://schemas.microsoft.com/office/drawing/2010/main" xmlns="" w="9525">
+              <a14:hiddenLine xmlns="" xmlns:a14="http://schemas.microsoft.com/office/drawing/2010/main" w="9525">
                 <a:solidFill>
                   <a:srgbClr val="000000"/>
                 </a:solidFill>
@@ -3530,14 +3530,14 @@
           </a:ln>
           <a:extLst>
             <a:ext uri="{909E8E84-426E-40dd-AFC4-6F175D3DCCD1}">
-              <a14:hiddenFill xmlns:a14="http://schemas.microsoft.com/office/drawing/2010/main" xmlns="">
+              <a14:hiddenFill xmlns="" xmlns:a14="http://schemas.microsoft.com/office/drawing/2010/main">
                 <a:solidFill>
                   <a:srgbClr val="FFFFFF"/>
                 </a:solidFill>
               </a14:hiddenFill>
             </a:ext>
             <a:ext uri="{91240B29-F687-4f45-9708-019B960494DF}">
-              <a14:hiddenLine xmlns:a14="http://schemas.microsoft.com/office/drawing/2010/main" xmlns="" w="9525">
+              <a14:hiddenLine xmlns="" xmlns:a14="http://schemas.microsoft.com/office/drawing/2010/main" w="9525">
                 <a:solidFill>
                   <a:srgbClr val="000000"/>
                 </a:solidFill>
@@ -3630,7 +3630,7 @@
             <a:fld id="{CCA49F0C-5252-4983-9722-A40AADD52538}" type="datetime1">
               <a:rPr lang="en-US"/>
               <a:pPr/>
-              <a:t>8/28/2017</a:t>
+              <a:t>9/8/2017</a:t>
             </a:fld>
             <a:endParaRPr lang="en-US"/>
           </a:p>
@@ -4245,7 +4245,7 @@
           </a:effectLst>
           <a:extLst>
             <a:ext uri="{909E8E84-426E-40dd-AFC4-6F175D3DCCD1}">
-              <a14:hiddenFill xmlns:a14="http://schemas.microsoft.com/office/drawing/2010/main" xmlns="">
+              <a14:hiddenFill xmlns="" xmlns:a14="http://schemas.microsoft.com/office/drawing/2010/main">
                 <a:noFill/>
               </a14:hiddenFill>
             </a:ext>
@@ -4274,14 +4274,14 @@
           </a:ln>
           <a:extLst>
             <a:ext uri="{909E8E84-426E-40dd-AFC4-6F175D3DCCD1}">
-              <a14:hiddenFill xmlns:a14="http://schemas.microsoft.com/office/drawing/2010/main" xmlns="">
+              <a14:hiddenFill xmlns="" xmlns:a14="http://schemas.microsoft.com/office/drawing/2010/main">
                 <a:solidFill>
                   <a:srgbClr val="FFFFFF"/>
                 </a:solidFill>
               </a14:hiddenFill>
             </a:ext>
             <a:ext uri="{91240B29-F687-4f45-9708-019B960494DF}">
-              <a14:hiddenLine xmlns:a14="http://schemas.microsoft.com/office/drawing/2010/main" xmlns="" w="9525">
+              <a14:hiddenLine xmlns="" xmlns:a14="http://schemas.microsoft.com/office/drawing/2010/main" w="9525">
                 <a:solidFill>
                   <a:srgbClr val="000000"/>
                 </a:solidFill>
@@ -4442,7 +4442,7 @@
           </a:ln>
           <a:extLst>
             <a:ext uri="{91240B29-F687-4f45-9708-019B960494DF}">
-              <a14:hiddenLine xmlns:a14="http://schemas.microsoft.com/office/drawing/2010/main" xmlns="" w="9525">
+              <a14:hiddenLine xmlns="" xmlns:a14="http://schemas.microsoft.com/office/drawing/2010/main" w="9525">
                 <a:solidFill>
                   <a:srgbClr val="000000"/>
                 </a:solidFill>
@@ -4676,8 +4676,8 @@
         </p:nvSpPr>
         <p:spPr bwMode="auto">
           <a:xfrm>
-            <a:off x="685799" y="20269200"/>
-            <a:ext cx="10622273" cy="5867399"/>
+            <a:off x="685799" y="20309088"/>
+            <a:ext cx="10622273" cy="5827511"/>
           </a:xfrm>
           <a:prstGeom prst="rect">
             <a:avLst/>
@@ -4690,7 +4690,7 @@
           </a:ln>
           <a:extLst>
             <a:ext uri="{91240B29-F687-4f45-9708-019B960494DF}">
-              <a14:hiddenLine xmlns:a14="http://schemas.microsoft.com/office/drawing/2010/main" xmlns="" w="9525">
+              <a14:hiddenLine xmlns="" xmlns:a14="http://schemas.microsoft.com/office/drawing/2010/main" w="9525">
                 <a:solidFill>
                   <a:srgbClr val="000000"/>
                 </a:solidFill>
@@ -5206,7 +5206,7 @@
         <p:spPr bwMode="auto">
           <a:xfrm>
             <a:off x="23849497" y="24993601"/>
-            <a:ext cx="11202504" cy="7010399"/>
+            <a:ext cx="11202504" cy="4800599"/>
           </a:xfrm>
           <a:prstGeom prst="rect">
             <a:avLst/>
@@ -5219,7 +5219,7 @@
           </a:ln>
           <a:extLst>
             <a:ext uri="{91240B29-F687-4f45-9708-019B960494DF}">
-              <a14:hiddenLine xmlns:a14="http://schemas.microsoft.com/office/drawing/2010/main" xmlns="" w="9525">
+              <a14:hiddenLine xmlns="" xmlns:a14="http://schemas.microsoft.com/office/drawing/2010/main" w="9525">
                 <a:solidFill>
                   <a:srgbClr val="000000"/>
                 </a:solidFill>
@@ -5568,205 +5568,6 @@
                 <a:latin typeface="Arial" panose="020B0604020202020204" pitchFamily="34" charset="0"/>
               </a:rPr>
               <a:t>).</a:t>
-            </a:r>
-          </a:p>
-          <a:p>
-            <a:pPr>
-              <a:spcBef>
-                <a:spcPts val="0"/>
-              </a:spcBef>
-            </a:pPr>
-            <a:endParaRPr lang="en-GB" sz="2400" b="1" dirty="0">
-              <a:solidFill>
-                <a:srgbClr val="000000"/>
-              </a:solidFill>
-              <a:latin typeface="Arial" panose="020B0604020202020204" pitchFamily="34" charset="0"/>
-            </a:endParaRPr>
-          </a:p>
-          <a:p>
-            <a:pPr>
-              <a:spcBef>
-                <a:spcPts val="0"/>
-              </a:spcBef>
-            </a:pPr>
-            <a:r>
-              <a:rPr lang="en-GB" sz="2400" b="1" dirty="0">
-                <a:solidFill>
-                  <a:srgbClr val="000000"/>
-                </a:solidFill>
-                <a:latin typeface="Arial" panose="020B0604020202020204" pitchFamily="34" charset="0"/>
-              </a:rPr>
-              <a:t>EQ2 : What are the names N of all program blocks?</a:t>
-            </a:r>
-          </a:p>
-          <a:p>
-            <a:pPr>
-              <a:spcBef>
-                <a:spcPts val="0"/>
-              </a:spcBef>
-            </a:pPr>
-            <a:r>
-              <a:rPr lang="en-GB" sz="2200" dirty="0">
-                <a:solidFill>
-                  <a:srgbClr val="000000"/>
-                </a:solidFill>
-                <a:latin typeface="Arial" panose="020B0604020202020204" pitchFamily="34" charset="0"/>
-              </a:rPr>
-              <a:t>eq2(</a:t>
-            </a:r>
-            <a:r>
-              <a:rPr lang="en-GB" sz="2200" dirty="0" err="1">
-                <a:solidFill>
-                  <a:srgbClr val="000000"/>
-                </a:solidFill>
-                <a:latin typeface="Arial" panose="020B0604020202020204" pitchFamily="34" charset="0"/>
-              </a:rPr>
-              <a:t>exec_paleocar</a:t>
-            </a:r>
-            <a:r>
-              <a:rPr lang="en-GB" sz="2200" dirty="0">
-                <a:solidFill>
-                  <a:srgbClr val="000000"/>
-                </a:solidFill>
-                <a:latin typeface="Arial" panose="020B0604020202020204" pitchFamily="34" charset="0"/>
-              </a:rPr>
-              <a:t>).</a:t>
-            </a:r>
-          </a:p>
-          <a:p>
-            <a:pPr>
-              <a:spcBef>
-                <a:spcPts val="0"/>
-              </a:spcBef>
-            </a:pPr>
-            <a:r>
-              <a:rPr lang="en-GB" sz="2200" dirty="0">
-                <a:solidFill>
-                  <a:srgbClr val="000000"/>
-                </a:solidFill>
-                <a:latin typeface="Arial" panose="020B0604020202020204" pitchFamily="34" charset="0"/>
-              </a:rPr>
-              <a:t>eq2(</a:t>
-            </a:r>
-            <a:r>
-              <a:rPr lang="en-GB" sz="2200" dirty="0" err="1">
-                <a:solidFill>
-                  <a:srgbClr val="000000"/>
-                </a:solidFill>
-                <a:latin typeface="Arial" panose="020B0604020202020204" pitchFamily="34" charset="0"/>
-              </a:rPr>
-              <a:t>extract_prism_data</a:t>
-            </a:r>
-            <a:r>
-              <a:rPr lang="en-GB" sz="2200" dirty="0">
-                <a:solidFill>
-                  <a:srgbClr val="000000"/>
-                </a:solidFill>
-                <a:latin typeface="Arial" panose="020B0604020202020204" pitchFamily="34" charset="0"/>
-              </a:rPr>
-              <a:t>).</a:t>
-            </a:r>
-          </a:p>
-          <a:p>
-            <a:pPr>
-              <a:spcBef>
-                <a:spcPts val="0"/>
-              </a:spcBef>
-            </a:pPr>
-            <a:r>
-              <a:rPr lang="en-GB" sz="2200" dirty="0">
-                <a:solidFill>
-                  <a:srgbClr val="000000"/>
-                </a:solidFill>
-                <a:latin typeface="Arial" panose="020B0604020202020204" pitchFamily="34" charset="0"/>
-              </a:rPr>
-              <a:t>eq2(</a:t>
-            </a:r>
-            <a:r>
-              <a:rPr lang="en-GB" sz="2200" dirty="0" err="1">
-                <a:solidFill>
-                  <a:srgbClr val="000000"/>
-                </a:solidFill>
-                <a:latin typeface="Arial" panose="020B0604020202020204" pitchFamily="34" charset="0"/>
-              </a:rPr>
-              <a:t>access_static_server_files</a:t>
-            </a:r>
-            <a:r>
-              <a:rPr lang="en-GB" sz="2200" dirty="0">
-                <a:solidFill>
-                  <a:srgbClr val="000000"/>
-                </a:solidFill>
-                <a:latin typeface="Arial" panose="020B0604020202020204" pitchFamily="34" charset="0"/>
-              </a:rPr>
-              <a:t>).</a:t>
-            </a:r>
-          </a:p>
-          <a:p>
-            <a:pPr>
-              <a:spcBef>
-                <a:spcPts val="0"/>
-              </a:spcBef>
-            </a:pPr>
-            <a:r>
-              <a:rPr lang="en-GB" sz="2200" dirty="0">
-                <a:solidFill>
-                  <a:srgbClr val="000000"/>
-                </a:solidFill>
-                <a:latin typeface="Arial" panose="020B0604020202020204" pitchFamily="34" charset="0"/>
-              </a:rPr>
-              <a:t>eq2(</a:t>
-            </a:r>
-            <a:r>
-              <a:rPr lang="en-GB" sz="2200" dirty="0" err="1">
-                <a:solidFill>
-                  <a:srgbClr val="000000"/>
-                </a:solidFill>
-                <a:latin typeface="Arial" panose="020B0604020202020204" pitchFamily="34" charset="0"/>
-              </a:rPr>
-              <a:t>get_client_data</a:t>
-            </a:r>
-            <a:r>
-              <a:rPr lang="en-GB" sz="2200" dirty="0">
-                <a:solidFill>
-                  <a:srgbClr val="000000"/>
-                </a:solidFill>
-                <a:latin typeface="Arial" panose="020B0604020202020204" pitchFamily="34" charset="0"/>
-              </a:rPr>
-              <a:t>).</a:t>
-            </a:r>
-          </a:p>
-          <a:p>
-            <a:pPr>
-              <a:spcBef>
-                <a:spcPts val="0"/>
-              </a:spcBef>
-            </a:pPr>
-            <a:r>
-              <a:rPr lang="en-GB" sz="2200" dirty="0">
-                <a:solidFill>
-                  <a:srgbClr val="000000"/>
-                </a:solidFill>
-                <a:latin typeface="Arial" panose="020B0604020202020204" pitchFamily="34" charset="0"/>
-              </a:rPr>
-              <a:t>eq2('</a:t>
-            </a:r>
-            <a:r>
-              <a:rPr lang="en-GB" sz="2200" dirty="0" err="1">
-                <a:solidFill>
-                  <a:srgbClr val="000000"/>
-                </a:solidFill>
-                <a:latin typeface="Arial" panose="020B0604020202020204" pitchFamily="34" charset="0"/>
-              </a:rPr>
-              <a:t>paleocar_web-app_data_flow</a:t>
-            </a:r>
-            <a:r>
-              <a:rPr lang="en-GB" sz="2200" dirty="0">
-                <a:solidFill>
-                  <a:srgbClr val="000000"/>
-                </a:solidFill>
-                <a:latin typeface="Arial" panose="020B0604020202020204" pitchFamily="34" charset="0"/>
-              </a:rPr>
-              <a:t>').</a:t>
             </a:r>
           </a:p>
         </p:txBody>
@@ -5815,7 +5616,7 @@
             </a:ln>
             <a:extLst>
               <a:ext uri="{91240B29-F687-4f45-9708-019B960494DF}">
-                <a14:hiddenLine xmlns:a14="http://schemas.microsoft.com/office/drawing/2010/main" xmlns="" w="9525">
+                <a14:hiddenLine xmlns="" xmlns:a14="http://schemas.microsoft.com/office/drawing/2010/main" w="9525">
                   <a:solidFill>
                     <a:srgbClr val="000000"/>
                   </a:solidFill>
@@ -5874,14 +5675,14 @@
             </a:ln>
             <a:extLst>
               <a:ext uri="{909E8E84-426E-40dd-AFC4-6F175D3DCCD1}">
-                <a14:hiddenFill xmlns:a14="http://schemas.microsoft.com/office/drawing/2010/main" xmlns="">
+                <a14:hiddenFill xmlns="" xmlns:a14="http://schemas.microsoft.com/office/drawing/2010/main">
                   <a:solidFill>
                     <a:srgbClr val="FFFFFF"/>
                   </a:solidFill>
                 </a14:hiddenFill>
               </a:ext>
               <a:ext uri="{91240B29-F687-4f45-9708-019B960494DF}">
-                <a14:hiddenLine xmlns:a14="http://schemas.microsoft.com/office/drawing/2010/main" xmlns="" w="9525">
+                <a14:hiddenLine xmlns="" xmlns:a14="http://schemas.microsoft.com/office/drawing/2010/main" w="9525">
                   <a:solidFill>
                     <a:srgbClr val="000000"/>
                   </a:solidFill>
@@ -5952,14 +5753,14 @@
           </a:ln>
           <a:extLst>
             <a:ext uri="{909E8E84-426E-40dd-AFC4-6F175D3DCCD1}">
-              <a14:hiddenFill xmlns:a14="http://schemas.microsoft.com/office/drawing/2010/main" xmlns="">
+              <a14:hiddenFill xmlns="" xmlns:a14="http://schemas.microsoft.com/office/drawing/2010/main">
                 <a:solidFill>
                   <a:srgbClr val="FFFFFF"/>
                 </a:solidFill>
               </a14:hiddenFill>
             </a:ext>
             <a:ext uri="{91240B29-F687-4f45-9708-019B960494DF}">
-              <a14:hiddenLine xmlns:a14="http://schemas.microsoft.com/office/drawing/2010/main" xmlns="" w="9525">
+              <a14:hiddenLine xmlns="" xmlns:a14="http://schemas.microsoft.com/office/drawing/2010/main" w="9525">
                 <a:solidFill>
                   <a:srgbClr val="000000"/>
                 </a:solidFill>
@@ -6168,8 +5969,8 @@
         </p:nvSpPr>
         <p:spPr bwMode="auto">
           <a:xfrm>
-            <a:off x="682022" y="12381508"/>
-            <a:ext cx="10613511" cy="7811492"/>
+            <a:off x="682022" y="12381507"/>
+            <a:ext cx="10613511" cy="7867745"/>
           </a:xfrm>
           <a:prstGeom prst="rect">
             <a:avLst/>
@@ -6182,7 +5983,7 @@
           </a:ln>
           <a:extLst>
             <a:ext uri="{91240B29-F687-4f45-9708-019B960494DF}">
-              <a14:hiddenLine xmlns:a14="http://schemas.microsoft.com/office/drawing/2010/main" xmlns="" w="9525">
+              <a14:hiddenLine xmlns="" xmlns:a14="http://schemas.microsoft.com/office/drawing/2010/main" w="9525">
                 <a:solidFill>
                   <a:srgbClr val="000000"/>
                 </a:solidFill>
@@ -6302,7 +6103,7 @@
             </a:pPr>
             <a:r>
               <a:rPr lang="en-US" sz="2800" dirty="0"/>
-              <a:t>The expected (prospective) provenance graph can be linked with </a:t>
+              <a:t>The prospective provenance graph can be linked with </a:t>
             </a:r>
             <a:r>
               <a:rPr lang="en-US" sz="2800" b="1" dirty="0"/>
@@ -6361,7 +6162,7 @@
           </a:ln>
           <a:extLst>
             <a:ext uri="{91240B29-F687-4f45-9708-019B960494DF}">
-              <a14:hiddenLine xmlns:a14="http://schemas.microsoft.com/office/drawing/2010/main" xmlns="" w="9525">
+              <a14:hiddenLine xmlns="" xmlns:a14="http://schemas.microsoft.com/office/drawing/2010/main" w="9525">
                 <a:solidFill>
                   <a:srgbClr val="000000"/>
                 </a:solidFill>
@@ -6444,7 +6245,7 @@
           </a:ln>
           <a:extLst>
             <a:ext uri="{91240B29-F687-4f45-9708-019B960494DF}">
-              <a14:hiddenLine xmlns:a14="http://schemas.microsoft.com/office/drawing/2010/main" xmlns="" w="9525">
+              <a14:hiddenLine xmlns="" xmlns:a14="http://schemas.microsoft.com/office/drawing/2010/main" w="9525">
                 <a:solidFill>
                   <a:srgbClr val="000000"/>
                 </a:solidFill>
@@ -6606,7 +6407,7 @@
           </a:ln>
           <a:extLst>
             <a:ext uri="{91240B29-F687-4f45-9708-019B960494DF}">
-              <a14:hiddenLine xmlns:a14="http://schemas.microsoft.com/office/drawing/2010/main" xmlns="" w="9525">
+              <a14:hiddenLine xmlns="" xmlns:a14="http://schemas.microsoft.com/office/drawing/2010/main" w="9525">
                 <a:solidFill>
                   <a:srgbClr val="000000"/>
                 </a:solidFill>
@@ -6671,7 +6472,7 @@
           </a:ln>
           <a:extLst>
             <a:ext uri="{91240B29-F687-4f45-9708-019B960494DF}">
-              <a14:hiddenLine xmlns:a14="http://schemas.microsoft.com/office/drawing/2010/main" xmlns="" w="9525">
+              <a14:hiddenLine xmlns="" xmlns:a14="http://schemas.microsoft.com/office/drawing/2010/main" w="9525">
                 <a:solidFill>
                   <a:srgbClr val="000000"/>
                 </a:solidFill>
@@ -6891,7 +6692,7 @@
             </a:ln>
             <a:extLst>
               <a:ext uri="{91240B29-F687-4f45-9708-019B960494DF}">
-                <a14:hiddenLine xmlns:a14="http://schemas.microsoft.com/office/drawing/2010/main" xmlns="" w="9525">
+                <a14:hiddenLine xmlns="" xmlns:a14="http://schemas.microsoft.com/office/drawing/2010/main" w="9525">
                   <a:solidFill>
                     <a:srgbClr val="000000"/>
                   </a:solidFill>
@@ -6995,7 +6796,7 @@
             </a:ln>
             <a:extLst>
               <a:ext uri="{91240B29-F687-4f45-9708-019B960494DF}">
-                <a14:hiddenLine xmlns:a14="http://schemas.microsoft.com/office/drawing/2010/main" xmlns="" w="9525">
+                <a14:hiddenLine xmlns="" xmlns:a14="http://schemas.microsoft.com/office/drawing/2010/main" w="9525">
                   <a:solidFill>
                     <a:srgbClr val="000000"/>
                   </a:solidFill>
@@ -7111,7 +6912,7 @@
             </a:ln>
             <a:extLst>
               <a:ext uri="{91240B29-F687-4f45-9708-019B960494DF}">
-                <a14:hiddenLine xmlns:a14="http://schemas.microsoft.com/office/drawing/2010/main" xmlns="" w="9525">
+                <a14:hiddenLine xmlns="" xmlns:a14="http://schemas.microsoft.com/office/drawing/2010/main" w="9525">
                   <a:solidFill>
                     <a:srgbClr val="000000"/>
                   </a:solidFill>
@@ -7319,7 +7120,7 @@
             </a:ln>
             <a:extLst>
               <a:ext uri="{91240B29-F687-4f45-9708-019B960494DF}">
-                <a14:hiddenLine xmlns:a14="http://schemas.microsoft.com/office/drawing/2010/main" xmlns="" w="9525">
+                <a14:hiddenLine xmlns="" xmlns:a14="http://schemas.microsoft.com/office/drawing/2010/main" w="9525">
                   <a:solidFill>
                     <a:srgbClr val="000000"/>
                   </a:solidFill>
@@ -7528,7 +7329,7 @@
               </a:ln>
               <a:extLst>
                 <a:ext uri="{91240B29-F687-4f45-9708-019B960494DF}">
-                  <a14:hiddenLine xmlns:a14="http://schemas.microsoft.com/office/drawing/2010/main" xmlns="" w="9525">
+                  <a14:hiddenLine xmlns="" xmlns:a14="http://schemas.microsoft.com/office/drawing/2010/main" w="9525">
                     <a:solidFill>
                       <a:srgbClr val="000000"/>
                     </a:solidFill>
@@ -7748,7 +7549,7 @@
               </a:ln>
               <a:extLst>
                 <a:ext uri="{91240B29-F687-4f45-9708-019B960494DF}">
-                  <a14:hiddenLine xmlns:a14="http://schemas.microsoft.com/office/drawing/2010/main" xmlns="" w="9525">
+                  <a14:hiddenLine xmlns="" xmlns:a14="http://schemas.microsoft.com/office/drawing/2010/main" w="9525">
                     <a:solidFill>
                       <a:srgbClr val="000000"/>
                     </a:solidFill>
@@ -8361,6 +8162,116 @@
           </p:style>
         </p:cxnSp>
       </p:grpSp>
+      <p:sp>
+        <p:nvSpPr>
+          <p:cNvPr id="58" name="Rectangle 35">
+            <a:extLst>
+              <a:ext uri="{FF2B5EF4-FFF2-40B4-BE49-F238E27FC236}">
+                <a16:creationId xmlns:a16="http://schemas.microsoft.com/office/drawing/2014/main" id="{8F5D679F-86F7-4005-9499-60FADF30BAC2}"/>
+              </a:ext>
+            </a:extLst>
+          </p:cNvPr>
+          <p:cNvSpPr>
+            <a:spLocks noChangeArrowheads="1"/>
+          </p:cNvSpPr>
+          <p:nvPr/>
+        </p:nvSpPr>
+        <p:spPr bwMode="auto">
+          <a:xfrm>
+            <a:off x="23837938" y="29908500"/>
+            <a:ext cx="11214061" cy="2095500"/>
+          </a:xfrm>
+          <a:prstGeom prst="rect">
+            <a:avLst/>
+          </a:prstGeom>
+          <a:solidFill>
+            <a:schemeClr val="bg1"/>
+          </a:solidFill>
+          <a:ln>
+            <a:noFill/>
+          </a:ln>
+          <a:extLst>
+            <a:ext uri="{91240B29-F687-4f45-9708-019B960494DF}">
+              <a14:hiddenLine xmlns="" xmlns:a14="http://schemas.microsoft.com/office/drawing/2010/main" w="9525">
+                <a:solidFill>
+                  <a:srgbClr val="000000"/>
+                </a:solidFill>
+                <a:miter lim="800000"/>
+                <a:headEnd/>
+                <a:tailEnd/>
+              </a14:hiddenLine>
+            </a:ext>
+          </a:extLst>
+        </p:spPr>
+        <p:txBody>
+          <a:bodyPr lIns="360000" tIns="360000" rIns="360000" bIns="360000"/>
+          <a:lstStyle/>
+          <a:p>
+            <a:pPr>
+              <a:spcBef>
+                <a:spcPct val="50000"/>
+              </a:spcBef>
+            </a:pPr>
+            <a:r>
+              <a:rPr lang="en-GB" sz="4000" b="1" dirty="0">
+                <a:solidFill>
+                  <a:srgbClr val="CC3300"/>
+                </a:solidFill>
+              </a:rPr>
+              <a:t>Acknowledgments</a:t>
+            </a:r>
+          </a:p>
+          <a:p>
+            <a:pPr>
+              <a:spcBef>
+                <a:spcPct val="50000"/>
+              </a:spcBef>
+            </a:pPr>
+            <a:r>
+              <a:rPr lang="en-US" sz="2800" dirty="0"/>
+              <a:t>Supported by NSF OAC-1541450, SMA-1637155</a:t>
+            </a:r>
+            <a:endParaRPr lang="en-GB" sz="2800" b="1" dirty="0">
+              <a:solidFill>
+                <a:srgbClr val="CC3300"/>
+              </a:solidFill>
+            </a:endParaRPr>
+          </a:p>
+          <a:p>
+            <a:endParaRPr lang="en-US" sz="2800" dirty="0"/>
+          </a:p>
+        </p:txBody>
+      </p:sp>
+      <p:pic>
+        <p:nvPicPr>
+          <p:cNvPr id="11" name="Picture 10" descr="A close up of a logo&#10;&#10;Description generated with very high confidence">
+            <a:extLst>
+              <a:ext uri="{FF2B5EF4-FFF2-40B4-BE49-F238E27FC236}">
+                <a16:creationId xmlns:a16="http://schemas.microsoft.com/office/drawing/2014/main" id="{D3FDFBDD-7EED-477A-9383-77408A08D118}"/>
+              </a:ext>
+            </a:extLst>
+          </p:cNvPr>
+          <p:cNvPicPr>
+            <a:picLocks noChangeAspect="1"/>
+          </p:cNvPicPr>
+          <p:nvPr/>
+        </p:nvPicPr>
+        <p:blipFill>
+          <a:blip r:embed="rId19"/>
+          <a:stretch>
+            <a:fillRect/>
+          </a:stretch>
+        </p:blipFill>
+        <p:spPr>
+          <a:xfrm>
+            <a:off x="33362450" y="30165675"/>
+            <a:ext cx="1581150" cy="1581150"/>
+          </a:xfrm>
+          <a:prstGeom prst="rect">
+            <a:avLst/>
+          </a:prstGeom>
+        </p:spPr>
+      </p:pic>
     </p:spTree>
   </p:cSld>
   <p:clrMapOvr>

</xml_diff>